<commit_message>
updated powerpoint with 1 more slide
</commit_message>
<xml_diff>
--- a/Powerpoints/CS0007 Week 7.pptx
+++ b/Powerpoints/CS0007 Week 7.pptx
@@ -6,8 +6,9 @@
   </p:sldMasterIdLst>
   <p:sldIdLst>
     <p:sldId id="256" r:id="rId2"/>
-    <p:sldId id="257" r:id="rId3"/>
-    <p:sldId id="258" r:id="rId4"/>
+    <p:sldId id="259" r:id="rId3"/>
+    <p:sldId id="257" r:id="rId4"/>
+    <p:sldId id="258" r:id="rId5"/>
   </p:sldIdLst>
   <p:sldSz cx="12192000" cy="6858000"/>
   <p:notesSz cx="6858000" cy="9144000"/>
@@ -106,6 +107,11 @@
       </a:defRPr>
     </a:lvl9pPr>
   </p:defaultTextStyle>
+  <p:extLst>
+    <p:ext uri="{EFAFB233-063F-42B5-8137-9DF3F51BA10A}">
+      <p15:sldGuideLst xmlns:p15="http://schemas.microsoft.com/office/powerpoint/2012/main"/>
+    </p:ext>
+  </p:extLst>
 </p:presentation>
 </file>
 
@@ -240,7 +246,7 @@
           <a:p>
             <a:fld id="{4E56E130-364A-41B2-9BD7-81DBE90AF5D7}" type="datetimeFigureOut">
               <a:rPr lang="en-US" smtClean="0"/>
-              <a:t>2/21/2016</a:t>
+              <a:t>2/24/2016</a:t>
             </a:fld>
             <a:endParaRPr lang="en-US"/>
           </a:p>
@@ -410,7 +416,7 @@
           <a:p>
             <a:fld id="{4E56E130-364A-41B2-9BD7-81DBE90AF5D7}" type="datetimeFigureOut">
               <a:rPr lang="en-US" smtClean="0"/>
-              <a:t>2/21/2016</a:t>
+              <a:t>2/24/2016</a:t>
             </a:fld>
             <a:endParaRPr lang="en-US"/>
           </a:p>
@@ -590,7 +596,7 @@
           <a:p>
             <a:fld id="{4E56E130-364A-41B2-9BD7-81DBE90AF5D7}" type="datetimeFigureOut">
               <a:rPr lang="en-US" smtClean="0"/>
-              <a:t>2/21/2016</a:t>
+              <a:t>2/24/2016</a:t>
             </a:fld>
             <a:endParaRPr lang="en-US"/>
           </a:p>
@@ -760,7 +766,7 @@
           <a:p>
             <a:fld id="{4E56E130-364A-41B2-9BD7-81DBE90AF5D7}" type="datetimeFigureOut">
               <a:rPr lang="en-US" smtClean="0"/>
-              <a:t>2/21/2016</a:t>
+              <a:t>2/24/2016</a:t>
             </a:fld>
             <a:endParaRPr lang="en-US"/>
           </a:p>
@@ -1006,7 +1012,7 @@
           <a:p>
             <a:fld id="{4E56E130-364A-41B2-9BD7-81DBE90AF5D7}" type="datetimeFigureOut">
               <a:rPr lang="en-US" smtClean="0"/>
-              <a:t>2/21/2016</a:t>
+              <a:t>2/24/2016</a:t>
             </a:fld>
             <a:endParaRPr lang="en-US"/>
           </a:p>
@@ -1238,7 +1244,7 @@
           <a:p>
             <a:fld id="{4E56E130-364A-41B2-9BD7-81DBE90AF5D7}" type="datetimeFigureOut">
               <a:rPr lang="en-US" smtClean="0"/>
-              <a:t>2/21/2016</a:t>
+              <a:t>2/24/2016</a:t>
             </a:fld>
             <a:endParaRPr lang="en-US"/>
           </a:p>
@@ -1605,7 +1611,7 @@
           <a:p>
             <a:fld id="{4E56E130-364A-41B2-9BD7-81DBE90AF5D7}" type="datetimeFigureOut">
               <a:rPr lang="en-US" smtClean="0"/>
-              <a:t>2/21/2016</a:t>
+              <a:t>2/24/2016</a:t>
             </a:fld>
             <a:endParaRPr lang="en-US"/>
           </a:p>
@@ -1723,7 +1729,7 @@
           <a:p>
             <a:fld id="{4E56E130-364A-41B2-9BD7-81DBE90AF5D7}" type="datetimeFigureOut">
               <a:rPr lang="en-US" smtClean="0"/>
-              <a:t>2/21/2016</a:t>
+              <a:t>2/24/2016</a:t>
             </a:fld>
             <a:endParaRPr lang="en-US"/>
           </a:p>
@@ -1818,7 +1824,7 @@
           <a:p>
             <a:fld id="{4E56E130-364A-41B2-9BD7-81DBE90AF5D7}" type="datetimeFigureOut">
               <a:rPr lang="en-US" smtClean="0"/>
-              <a:t>2/21/2016</a:t>
+              <a:t>2/24/2016</a:t>
             </a:fld>
             <a:endParaRPr lang="en-US"/>
           </a:p>
@@ -2095,7 +2101,7 @@
           <a:p>
             <a:fld id="{4E56E130-364A-41B2-9BD7-81DBE90AF5D7}" type="datetimeFigureOut">
               <a:rPr lang="en-US" smtClean="0"/>
-              <a:t>2/21/2016</a:t>
+              <a:t>2/24/2016</a:t>
             </a:fld>
             <a:endParaRPr lang="en-US"/>
           </a:p>
@@ -2348,7 +2354,7 @@
           <a:p>
             <a:fld id="{4E56E130-364A-41B2-9BD7-81DBE90AF5D7}" type="datetimeFigureOut">
               <a:rPr lang="en-US" smtClean="0"/>
-              <a:t>2/21/2016</a:t>
+              <a:t>2/24/2016</a:t>
             </a:fld>
             <a:endParaRPr lang="en-US"/>
           </a:p>
@@ -2561,7 +2567,7 @@
           <a:p>
             <a:fld id="{4E56E130-364A-41B2-9BD7-81DBE90AF5D7}" type="datetimeFigureOut">
               <a:rPr lang="en-US" smtClean="0"/>
-              <a:t>2/21/2016</a:t>
+              <a:t>2/24/2016</a:t>
             </a:fld>
             <a:endParaRPr lang="en-US"/>
           </a:p>
@@ -3059,6 +3065,124 @@
           <a:p>
             <a:r>
               <a:rPr lang="en-US" dirty="0" smtClean="0"/>
+              <a:t>Activity 3</a:t>
+            </a:r>
+            <a:endParaRPr lang="en-US" dirty="0"/>
+          </a:p>
+        </p:txBody>
+      </p:sp>
+      <p:sp>
+        <p:nvSpPr>
+          <p:cNvPr id="3" name="Content Placeholder 2"/>
+          <p:cNvSpPr>
+            <a:spLocks noGrp="1"/>
+          </p:cNvSpPr>
+          <p:nvPr>
+            <p:ph idx="1"/>
+          </p:nvPr>
+        </p:nvSpPr>
+        <p:spPr/>
+        <p:txBody>
+          <a:bodyPr/>
+          <a:lstStyle/>
+          <a:p>
+            <a:r>
+              <a:rPr lang="en-US" dirty="0" smtClean="0"/>
+              <a:t>Three main actions need to be done:</a:t>
+            </a:r>
+          </a:p>
+          <a:p>
+            <a:pPr lvl="1"/>
+            <a:r>
+              <a:rPr lang="en-US" dirty="0" smtClean="0"/>
+              <a:t>Generate rolls of the dice (using Random numbers)</a:t>
+            </a:r>
+          </a:p>
+          <a:p>
+            <a:pPr lvl="1"/>
+            <a:r>
+              <a:rPr lang="en-US" dirty="0" smtClean="0"/>
+              <a:t>Print out results</a:t>
+            </a:r>
+          </a:p>
+          <a:p>
+            <a:pPr lvl="1"/>
+            <a:r>
+              <a:rPr lang="en-US" dirty="0" smtClean="0"/>
+              <a:t>Decide whether the user won or not</a:t>
+            </a:r>
+          </a:p>
+          <a:p>
+            <a:pPr lvl="1"/>
+            <a:endParaRPr lang="en-US" dirty="0"/>
+          </a:p>
+          <a:p>
+            <a:pPr lvl="1"/>
+            <a:endParaRPr lang="en-US" dirty="0"/>
+          </a:p>
+          <a:p>
+            <a:pPr lvl="1"/>
+            <a:endParaRPr lang="en-US" dirty="0" smtClean="0"/>
+          </a:p>
+          <a:p>
+            <a:pPr marL="457200" lvl="1" indent="0">
+              <a:buNone/>
+            </a:pPr>
+            <a:r>
+              <a:rPr lang="en-US" dirty="0" smtClean="0"/>
+              <a:t>*Look at your flowchart from activity 2 if you are confused on the steps in the game </a:t>
+            </a:r>
+            <a:endParaRPr lang="en-US" dirty="0"/>
+          </a:p>
+        </p:txBody>
+      </p:sp>
+    </p:spTree>
+    <p:extLst>
+      <p:ext uri="{BB962C8B-B14F-4D97-AF65-F5344CB8AC3E}">
+        <p14:creationId xmlns:p14="http://schemas.microsoft.com/office/powerpoint/2010/main" val="1806123189"/>
+      </p:ext>
+    </p:extLst>
+  </p:cSld>
+  <p:clrMapOvr>
+    <a:masterClrMapping/>
+  </p:clrMapOvr>
+</p:sld>
+</file>
+
+<file path=ppt/slides/slide3.xml><?xml version="1.0" encoding="utf-8"?>
+<p:sld xmlns:a="http://schemas.openxmlformats.org/drawingml/2006/main" xmlns:r="http://schemas.openxmlformats.org/officeDocument/2006/relationships" xmlns:p="http://schemas.openxmlformats.org/presentationml/2006/main">
+  <p:cSld>
+    <p:spTree>
+      <p:nvGrpSpPr>
+        <p:cNvPr id="1" name=""/>
+        <p:cNvGrpSpPr/>
+        <p:nvPr/>
+      </p:nvGrpSpPr>
+      <p:grpSpPr>
+        <a:xfrm>
+          <a:off x="0" y="0"/>
+          <a:ext cx="0" cy="0"/>
+          <a:chOff x="0" y="0"/>
+          <a:chExt cx="0" cy="0"/>
+        </a:xfrm>
+      </p:grpSpPr>
+      <p:sp>
+        <p:nvSpPr>
+          <p:cNvPr id="2" name="Title 1"/>
+          <p:cNvSpPr>
+            <a:spLocks noGrp="1"/>
+          </p:cNvSpPr>
+          <p:nvPr>
+            <p:ph type="title"/>
+          </p:nvPr>
+        </p:nvSpPr>
+        <p:spPr/>
+        <p:txBody>
+          <a:bodyPr/>
+          <a:lstStyle/>
+          <a:p>
+            <a:r>
+              <a:rPr lang="en-US" dirty="0" smtClean="0"/>
               <a:t>Random numbers</a:t>
             </a:r>
             <a:endParaRPr lang="en-US" dirty="0"/>
@@ -3146,7 +3270,7 @@
 </p:sld>
 </file>
 
-<file path=ppt/slides/slide3.xml><?xml version="1.0" encoding="utf-8"?>
+<file path=ppt/slides/slide4.xml><?xml version="1.0" encoding="utf-8"?>
 <p:sld xmlns:a="http://schemas.openxmlformats.org/drawingml/2006/main" xmlns:r="http://schemas.openxmlformats.org/officeDocument/2006/relationships" xmlns:p="http://schemas.openxmlformats.org/presentationml/2006/main">
   <p:cSld>
     <p:spTree>

</xml_diff>